<commit_message>
Updating CBW 2021 Lectures
</commit_message>
<xml_diff>
--- a/assets/lectures/cbw/2021/full/RNASeq_Module1_IntrotoRNA.pptx
+++ b/assets/lectures/cbw/2021/full/RNASeq_Module1_IntrotoRNA.pptx
@@ -289,7 +289,7 @@
               <a:pPr>
                 <a:defRPr/>
               </a:pPr>
-              <a:t>6/16/20</a:t>
+              <a:t>9/7/21</a:t>
             </a:fld>
             <a:endParaRPr lang="en-US"/>
           </a:p>
@@ -496,7 +496,7 @@
               <a:pPr>
                 <a:defRPr/>
               </a:pPr>
-              <a:t>6/16/20</a:t>
+              <a:t>9/7/21</a:t>
             </a:fld>
             <a:endParaRPr lang="en-US"/>
           </a:p>
@@ -7478,35 +7478,35 @@
           <a:p>
             <a:pPr lvl="0"/>
             <a:r>
-              <a:rPr lang="en-US"/>
+              <a:rPr lang="en-US" dirty="0"/>
               <a:t>Click to edit Master text styles</a:t>
             </a:r>
           </a:p>
           <a:p>
             <a:pPr lvl="1"/>
             <a:r>
-              <a:rPr lang="en-US"/>
+              <a:rPr lang="en-US" dirty="0"/>
               <a:t>Second level</a:t>
             </a:r>
           </a:p>
           <a:p>
             <a:pPr lvl="2"/>
             <a:r>
-              <a:rPr lang="en-US"/>
+              <a:rPr lang="en-US" dirty="0"/>
               <a:t>Third level</a:t>
             </a:r>
           </a:p>
           <a:p>
             <a:pPr lvl="3"/>
             <a:r>
-              <a:rPr lang="en-US"/>
+              <a:rPr lang="en-US" dirty="0"/>
               <a:t>Fourth level</a:t>
             </a:r>
           </a:p>
           <a:p>
             <a:pPr lvl="4"/>
             <a:r>
-              <a:rPr lang="en-US"/>
+              <a:rPr lang="en-US" dirty="0"/>
               <a:t>Fifth level</a:t>
             </a:r>
           </a:p>
@@ -7742,7 +7742,7 @@
                 <a:latin typeface="Calibri" charset="0"/>
                 <a:cs typeface="Calibri" charset="0"/>
               </a:rPr>
-              <a:t>Module 0</a:t>
+              <a:t>RNA: Module 1</a:t>
             </a:r>
           </a:p>
         </p:txBody>
@@ -7886,13 +7886,13 @@
               <a:defRPr/>
             </a:pPr>
             <a:r>
-              <a:rPr lang="en-US" sz="1800" b="1" dirty="0">
+              <a:rPr lang="en-US" sz="1800" b="1" dirty="0" err="1">
                 <a:solidFill>
                   <a:schemeClr val="bg1"/>
                 </a:solidFill>
                 <a:cs typeface="Arial" charset="0"/>
               </a:rPr>
-              <a:t>rnabio.org</a:t>
+              <a:t>bioinformatics.ca</a:t>
             </a:r>
             <a:endParaRPr lang="en-US" sz="1800" dirty="0">
               <a:solidFill>
@@ -12462,13 +12462,19 @@
       </p:sp>
       <p:sp>
         <p:nvSpPr>
-          <p:cNvPr id="100" name="Google Shape;100;p5"/>
+          <p:cNvPr id="8" name="Google Shape;100;p5">
+            <a:extLst>
+              <a:ext uri="{FF2B5EF4-FFF2-40B4-BE49-F238E27FC236}">
+                <a16:creationId xmlns:a16="http://schemas.microsoft.com/office/drawing/2014/main" id="{96A4E4F5-8E19-5E48-BBC8-68AF28060ACC}"/>
+              </a:ext>
+            </a:extLst>
+          </p:cNvPr>
           <p:cNvSpPr txBox="1"/>
           <p:nvPr/>
         </p:nvSpPr>
         <p:spPr>
           <a:xfrm>
-            <a:off x="790832" y="3966519"/>
+            <a:off x="794951" y="3448906"/>
             <a:ext cx="10602098" cy="369332"/>
           </a:xfrm>
           <a:prstGeom prst="rect">
@@ -12495,7 +12501,7 @@
               <a:buNone/>
             </a:pPr>
             <a:r>
-              <a:rPr lang="en-US" sz="1800">
+              <a:rPr lang="en-US" sz="1800" dirty="0">
                 <a:solidFill>
                   <a:schemeClr val="dk1"/>
                 </a:solidFill>
@@ -12506,116 +12512,290 @@
               </a:rPr>
               <a:t>Workshop Sponsors:</a:t>
             </a:r>
-            <a:endParaRPr/>
+            <a:endParaRPr dirty="0"/>
           </a:p>
         </p:txBody>
       </p:sp>
       <p:pic>
         <p:nvPicPr>
-          <p:cNvPr id="101" name="Google Shape;101;p5"/>
-          <p:cNvPicPr preferRelativeResize="0"/>
+          <p:cNvPr id="9" name="Picture 2">
+            <a:extLst>
+              <a:ext uri="{FF2B5EF4-FFF2-40B4-BE49-F238E27FC236}">
+                <a16:creationId xmlns:a16="http://schemas.microsoft.com/office/drawing/2014/main" id="{6281E846-B77A-1F45-82D4-79E9578C242B}"/>
+              </a:ext>
+            </a:extLst>
+          </p:cNvPr>
+          <p:cNvPicPr>
+            <a:picLocks noChangeAspect="1" noChangeArrowheads="1"/>
+          </p:cNvPicPr>
           <p:nvPr/>
         </p:nvPicPr>
-        <p:blipFill rotWithShape="1">
+        <p:blipFill>
           <a:blip r:embed="rId3">
-            <a:alphaModFix/>
+            <a:extLst>
+              <a:ext uri="{28A0092B-C50C-407E-A947-70E740481C1C}">
+                <a14:useLocalDpi xmlns:a14="http://schemas.microsoft.com/office/drawing/2010/main" val="0"/>
+              </a:ext>
+            </a:extLst>
           </a:blip>
           <a:srcRect/>
-          <a:stretch/>
+          <a:stretch>
+            <a:fillRect/>
+          </a:stretch>
         </p:blipFill>
-        <p:spPr>
+        <p:spPr bwMode="auto">
           <a:xfrm>
-            <a:off x="2514600" y="4517673"/>
-            <a:ext cx="1676400" cy="1206500"/>
+            <a:off x="3389395" y="4199772"/>
+            <a:ext cx="1719035" cy="1621600"/>
           </a:xfrm>
           <a:prstGeom prst="rect">
             <a:avLst/>
           </a:prstGeom>
           <a:noFill/>
-          <a:ln>
-            <a:noFill/>
-          </a:ln>
+          <a:extLst>
+            <a:ext uri="{909E8E84-426E-40DD-AFC4-6F175D3DCCD1}">
+              <a14:hiddenFill xmlns:a14="http://schemas.microsoft.com/office/drawing/2010/main">
+                <a:solidFill>
+                  <a:srgbClr val="FFFFFF"/>
+                </a:solidFill>
+              </a14:hiddenFill>
+            </a:ext>
+          </a:extLst>
         </p:spPr>
       </p:pic>
       <p:pic>
         <p:nvPicPr>
-          <p:cNvPr id="102" name="Google Shape;102;p5"/>
-          <p:cNvPicPr preferRelativeResize="0"/>
+          <p:cNvPr id="10" name="Picture 3">
+            <a:extLst>
+              <a:ext uri="{FF2B5EF4-FFF2-40B4-BE49-F238E27FC236}">
+                <a16:creationId xmlns:a16="http://schemas.microsoft.com/office/drawing/2014/main" id="{52AA7974-A87F-404B-B0DC-8C686D8B30D2}"/>
+              </a:ext>
+            </a:extLst>
+          </p:cNvPr>
+          <p:cNvPicPr>
+            <a:picLocks noChangeAspect="1" noChangeArrowheads="1"/>
+          </p:cNvPicPr>
           <p:nvPr/>
         </p:nvPicPr>
-        <p:blipFill rotWithShape="1">
+        <p:blipFill>
           <a:blip r:embed="rId4">
-            <a:alphaModFix/>
+            <a:extLst>
+              <a:ext uri="{28A0092B-C50C-407E-A947-70E740481C1C}">
+                <a14:useLocalDpi xmlns:a14="http://schemas.microsoft.com/office/drawing/2010/main" val="0"/>
+              </a:ext>
+            </a:extLst>
           </a:blip>
           <a:srcRect/>
-          <a:stretch/>
+          <a:stretch>
+            <a:fillRect/>
+          </a:stretch>
         </p:blipFill>
-        <p:spPr>
+        <p:spPr bwMode="auto">
           <a:xfrm>
-            <a:off x="4781024" y="4858491"/>
-            <a:ext cx="2781300" cy="787400"/>
+            <a:off x="5693506" y="4234674"/>
+            <a:ext cx="1895957" cy="1375431"/>
           </a:xfrm>
           <a:prstGeom prst="rect">
             <a:avLst/>
           </a:prstGeom>
           <a:noFill/>
-          <a:ln>
-            <a:noFill/>
-          </a:ln>
+          <a:extLst>
+            <a:ext uri="{909E8E84-426E-40DD-AFC4-6F175D3DCCD1}">
+              <a14:hiddenFill xmlns:a14="http://schemas.microsoft.com/office/drawing/2010/main">
+                <a:solidFill>
+                  <a:srgbClr val="FFFFFF"/>
+                </a:solidFill>
+              </a14:hiddenFill>
+            </a:ext>
+          </a:extLst>
         </p:spPr>
       </p:pic>
       <p:pic>
         <p:nvPicPr>
-          <p:cNvPr id="103" name="Google Shape;103;p5"/>
-          <p:cNvPicPr preferRelativeResize="0"/>
+          <p:cNvPr id="11" name="Picture 4">
+            <a:extLst>
+              <a:ext uri="{FF2B5EF4-FFF2-40B4-BE49-F238E27FC236}">
+                <a16:creationId xmlns:a16="http://schemas.microsoft.com/office/drawing/2014/main" id="{865F7923-7B82-6549-AED3-D2168CBE17DF}"/>
+              </a:ext>
+            </a:extLst>
+          </p:cNvPr>
+          <p:cNvPicPr>
+            <a:picLocks noChangeAspect="1" noChangeArrowheads="1"/>
+          </p:cNvPicPr>
           <p:nvPr/>
         </p:nvPicPr>
-        <p:blipFill rotWithShape="1">
+        <p:blipFill>
           <a:blip r:embed="rId5">
-            <a:alphaModFix/>
+            <a:extLst>
+              <a:ext uri="{28A0092B-C50C-407E-A947-70E740481C1C}">
+                <a14:useLocalDpi xmlns:a14="http://schemas.microsoft.com/office/drawing/2010/main" val="0"/>
+              </a:ext>
+            </a:extLst>
           </a:blip>
           <a:srcRect/>
-          <a:stretch/>
+          <a:stretch>
+            <a:fillRect/>
+          </a:stretch>
         </p:blipFill>
-        <p:spPr>
+        <p:spPr bwMode="auto">
           <a:xfrm>
-            <a:off x="7819767" y="4660327"/>
-            <a:ext cx="3114941" cy="1126171"/>
+            <a:off x="8309003" y="3501184"/>
+            <a:ext cx="3764337" cy="1375431"/>
           </a:xfrm>
           <a:prstGeom prst="rect">
             <a:avLst/>
           </a:prstGeom>
           <a:noFill/>
-          <a:ln>
-            <a:noFill/>
-          </a:ln>
+          <a:extLst>
+            <a:ext uri="{909E8E84-426E-40DD-AFC4-6F175D3DCCD1}">
+              <a14:hiddenFill xmlns:a14="http://schemas.microsoft.com/office/drawing/2010/main">
+                <a:solidFill>
+                  <a:srgbClr val="FFFFFF"/>
+                </a:solidFill>
+              </a14:hiddenFill>
+            </a:ext>
+          </a:extLst>
         </p:spPr>
       </p:pic>
       <p:pic>
         <p:nvPicPr>
-          <p:cNvPr id="105" name="Google Shape;105;p5" descr="Comp_Ca"/>
-          <p:cNvPicPr preferRelativeResize="0"/>
+          <p:cNvPr id="12" name="Picture 5">
+            <a:extLst>
+              <a:ext uri="{FF2B5EF4-FFF2-40B4-BE49-F238E27FC236}">
+                <a16:creationId xmlns:a16="http://schemas.microsoft.com/office/drawing/2014/main" id="{3D922AE2-4AB7-A045-9E5A-2075EA53023C}"/>
+              </a:ext>
+            </a:extLst>
+          </p:cNvPr>
+          <p:cNvPicPr>
+            <a:picLocks noChangeAspect="1" noChangeArrowheads="1"/>
+          </p:cNvPicPr>
           <p:nvPr/>
         </p:nvPicPr>
-        <p:blipFill rotWithShape="1">
+        <p:blipFill>
           <a:blip r:embed="rId6">
-            <a:alphaModFix/>
+            <a:extLst>
+              <a:ext uri="{28A0092B-C50C-407E-A947-70E740481C1C}">
+                <a14:useLocalDpi xmlns:a14="http://schemas.microsoft.com/office/drawing/2010/main" val="0"/>
+              </a:ext>
+            </a:extLst>
           </a:blip>
           <a:srcRect/>
-          <a:stretch/>
+          <a:stretch>
+            <a:fillRect/>
+          </a:stretch>
         </p:blipFill>
-        <p:spPr>
+        <p:spPr bwMode="auto">
           <a:xfrm>
-            <a:off x="445006" y="4545552"/>
-            <a:ext cx="1183055" cy="1510030"/>
+            <a:off x="259096" y="4057148"/>
+            <a:ext cx="2275780" cy="648001"/>
           </a:xfrm>
           <a:prstGeom prst="rect">
             <a:avLst/>
           </a:prstGeom>
           <a:noFill/>
-          <a:ln>
-            <a:noFill/>
-          </a:ln>
+          <a:extLst>
+            <a:ext uri="{909E8E84-426E-40DD-AFC4-6F175D3DCCD1}">
+              <a14:hiddenFill xmlns:a14="http://schemas.microsoft.com/office/drawing/2010/main">
+                <a:solidFill>
+                  <a:srgbClr val="FFFFFF"/>
+                </a:solidFill>
+              </a14:hiddenFill>
+            </a:ext>
+          </a:extLst>
+        </p:spPr>
+      </p:pic>
+      <p:pic>
+        <p:nvPicPr>
+          <p:cNvPr id="13" name="Picture 6">
+            <a:extLst>
+              <a:ext uri="{FF2B5EF4-FFF2-40B4-BE49-F238E27FC236}">
+                <a16:creationId xmlns:a16="http://schemas.microsoft.com/office/drawing/2014/main" id="{519F25B8-FD6E-D547-B4F4-241D2ED0414F}"/>
+              </a:ext>
+            </a:extLst>
+          </p:cNvPr>
+          <p:cNvPicPr>
+            <a:picLocks noChangeAspect="1" noChangeArrowheads="1"/>
+          </p:cNvPicPr>
+          <p:nvPr/>
+        </p:nvPicPr>
+        <p:blipFill>
+          <a:blip r:embed="rId7">
+            <a:extLst>
+              <a:ext uri="{28A0092B-C50C-407E-A947-70E740481C1C}">
+                <a14:useLocalDpi xmlns:a14="http://schemas.microsoft.com/office/drawing/2010/main" val="0"/>
+              </a:ext>
+            </a:extLst>
+          </a:blip>
+          <a:srcRect/>
+          <a:stretch>
+            <a:fillRect/>
+          </a:stretch>
+        </p:blipFill>
+        <p:spPr bwMode="auto">
+          <a:xfrm>
+            <a:off x="8933308" y="4644230"/>
+            <a:ext cx="2420492" cy="1610728"/>
+          </a:xfrm>
+          <a:prstGeom prst="rect">
+            <a:avLst/>
+          </a:prstGeom>
+          <a:noFill/>
+          <a:extLst>
+            <a:ext uri="{909E8E84-426E-40DD-AFC4-6F175D3DCCD1}">
+              <a14:hiddenFill xmlns:a14="http://schemas.microsoft.com/office/drawing/2010/main">
+                <a:solidFill>
+                  <a:srgbClr val="FFFFFF"/>
+                </a:solidFill>
+              </a14:hiddenFill>
+            </a:ext>
+          </a:extLst>
+        </p:spPr>
+      </p:pic>
+      <p:pic>
+        <p:nvPicPr>
+          <p:cNvPr id="14" name="Picture 7">
+            <a:extLst>
+              <a:ext uri="{FF2B5EF4-FFF2-40B4-BE49-F238E27FC236}">
+                <a16:creationId xmlns:a16="http://schemas.microsoft.com/office/drawing/2014/main" id="{A61525C6-32F6-2340-B80D-044D768669B8}"/>
+              </a:ext>
+            </a:extLst>
+          </p:cNvPr>
+          <p:cNvPicPr>
+            <a:picLocks noChangeAspect="1" noChangeArrowheads="1"/>
+          </p:cNvPicPr>
+          <p:nvPr/>
+        </p:nvPicPr>
+        <p:blipFill>
+          <a:blip r:embed="rId8">
+            <a:extLst>
+              <a:ext uri="{28A0092B-C50C-407E-A947-70E740481C1C}">
+                <a14:useLocalDpi xmlns:a14="http://schemas.microsoft.com/office/drawing/2010/main" val="0"/>
+              </a:ext>
+            </a:extLst>
+          </a:blip>
+          <a:srcRect/>
+          <a:stretch>
+            <a:fillRect/>
+          </a:stretch>
+        </p:blipFill>
+        <p:spPr bwMode="auto">
+          <a:xfrm>
+            <a:off x="1307903" y="4898276"/>
+            <a:ext cx="1475294" cy="1423658"/>
+          </a:xfrm>
+          <a:prstGeom prst="rect">
+            <a:avLst/>
+          </a:prstGeom>
+          <a:noFill/>
+          <a:extLst>
+            <a:ext uri="{909E8E84-426E-40DD-AFC4-6F175D3DCCD1}">
+              <a14:hiddenFill xmlns:a14="http://schemas.microsoft.com/office/drawing/2010/main">
+                <a:solidFill>
+                  <a:srgbClr val="FFFFFF"/>
+                </a:solidFill>
+              </a14:hiddenFill>
+            </a:ext>
+          </a:extLst>
         </p:spPr>
       </p:pic>
     </p:spTree>
@@ -12729,52 +12909,12 @@
               </a:buClr>
             </a:pPr>
             <a:r>
-              <a:rPr lang="en-US" sz="2000" dirty="0" err="1">
+              <a:rPr lang="en-US" sz="2000" dirty="0">
                 <a:solidFill>
                   <a:schemeClr val="lt1"/>
                 </a:solidFill>
               </a:rPr>
-              <a:t>Kelsy</a:t>
-            </a:r>
-            <a:r>
-              <a:rPr lang="en-US" sz="2000" dirty="0">
-                <a:solidFill>
-                  <a:schemeClr val="lt1"/>
-                </a:solidFill>
-              </a:rPr>
-              <a:t> </a:t>
-            </a:r>
-            <a:r>
-              <a:rPr lang="en-US" sz="2000" dirty="0" err="1">
-                <a:solidFill>
-                  <a:schemeClr val="lt1"/>
-                </a:solidFill>
-              </a:rPr>
-              <a:t>Cotto</a:t>
-            </a:r>
-            <a:r>
-              <a:rPr lang="en-US" sz="2000" dirty="0">
-                <a:solidFill>
-                  <a:schemeClr val="lt1"/>
-                </a:solidFill>
-              </a:rPr>
-              <a:t>, Obi Griffith, Malachi Griffith, Saad Khan, Allegra Petti, </a:t>
-            </a:r>
-            <a:r>
-              <a:rPr lang="en-US" sz="2000" dirty="0" err="1">
-                <a:solidFill>
-                  <a:schemeClr val="lt1"/>
-                </a:solidFill>
-              </a:rPr>
-              <a:t>Huiming</a:t>
-            </a:r>
-            <a:r>
-              <a:rPr lang="en-US" sz="2000" dirty="0">
-                <a:solidFill>
-                  <a:schemeClr val="lt1"/>
-                </a:solidFill>
-              </a:rPr>
-              <a:t> Xia </a:t>
+              <a:t>Emma Bell, Felicia Gomez, Obi Griffith, Malachi Griffith, Huiming Xia </a:t>
             </a:r>
           </a:p>
           <a:p>
@@ -12800,23 +12940,7 @@
                   <a:schemeClr val="lt1"/>
                 </a:solidFill>
               </a:rPr>
-              <a:t>Informatics for RNA-</a:t>
-            </a:r>
-            <a:r>
-              <a:rPr lang="en-US" dirty="0" err="1">
-                <a:solidFill>
-                  <a:schemeClr val="lt1"/>
-                </a:solidFill>
-              </a:rPr>
-              <a:t>Seq</a:t>
-            </a:r>
-            <a:r>
-              <a:rPr lang="en-US" dirty="0">
-                <a:solidFill>
-                  <a:schemeClr val="lt1"/>
-                </a:solidFill>
-              </a:rPr>
-              <a:t> Analysis</a:t>
+              <a:t>RNA-Seq Analysis</a:t>
             </a:r>
             <a:endParaRPr dirty="0"/>
           </a:p>
@@ -12843,7 +12967,39 @@
                   <a:schemeClr val="lt1"/>
                 </a:solidFill>
               </a:rPr>
-              <a:t>June 17-19, 2020</a:t>
+              <a:t>Sep 8</a:t>
+            </a:r>
+            <a:r>
+              <a:rPr lang="en-US" baseline="30000" dirty="0">
+                <a:solidFill>
+                  <a:schemeClr val="lt1"/>
+                </a:solidFill>
+              </a:rPr>
+              <a:t>th</a:t>
+            </a:r>
+            <a:r>
+              <a:rPr lang="en-US" dirty="0">
+                <a:solidFill>
+                  <a:schemeClr val="lt1"/>
+                </a:solidFill>
+              </a:rPr>
+              <a:t>-10</a:t>
+            </a:r>
+            <a:r>
+              <a:rPr lang="en-US" baseline="30000" dirty="0">
+                <a:solidFill>
+                  <a:schemeClr val="lt1"/>
+                </a:solidFill>
+              </a:rPr>
+              <a:t>th</a:t>
+            </a:r>
+            <a:r>
+              <a:rPr lang="en-US" dirty="0">
+                <a:solidFill>
+                  <a:schemeClr val="lt1"/>
+                </a:solidFill>
+              </a:rPr>
+              <a:t>, 2021</a:t>
             </a:r>
             <a:endParaRPr dirty="0"/>
           </a:p>

</xml_diff>

<commit_message>
remove scRNA from outline
</commit_message>
<xml_diff>
--- a/assets/lectures/cbw/2021/full/RNASeq_Module1_IntrotoRNA.pptx
+++ b/assets/lectures/cbw/2021/full/RNASeq_Module1_IntrotoRNA.pptx
@@ -1836,14 +1836,14 @@
           <a:noFill/>
           <a:extLst>
             <a:ext uri="{909E8E84-426E-40dd-AFC4-6F175D3DCCD1}">
-              <a14:hiddenFill xmlns:a14="http://schemas.microsoft.com/office/drawing/2010/main" xmlns="">
+              <a14:hiddenFill xmlns="" xmlns:a14="http://schemas.microsoft.com/office/drawing/2010/main">
                 <a:solidFill>
                   <a:srgbClr val="FFFFFF"/>
                 </a:solidFill>
               </a14:hiddenFill>
             </a:ext>
             <a:ext uri="{91240B29-F687-4f45-9708-019B960494DF}">
-              <a14:hiddenLine xmlns:a14="http://schemas.microsoft.com/office/drawing/2010/main" xmlns="" w="9525">
+              <a14:hiddenLine xmlns="" xmlns:a14="http://schemas.microsoft.com/office/drawing/2010/main" w="9525">
                 <a:solidFill>
                   <a:srgbClr val="000000"/>
                 </a:solidFill>
@@ -2007,7 +2007,7 @@
           </a:ln>
           <a:extLst>
             <a:ext uri="{FAA26D3D-D897-4be2-8F04-BA451C77F1D7}">
-              <ma14:placeholderFlag xmlns:ma14="http://schemas.microsoft.com/office/mac/drawingml/2011/main" xmlns="" val="1"/>
+              <ma14:placeholderFlag xmlns="" xmlns:ma14="http://schemas.microsoft.com/office/mac/drawingml/2011/main" val="1"/>
             </a:ext>
           </a:extLst>
         </p:spPr>
@@ -2036,7 +2036,7 @@
           </a:ln>
           <a:extLst>
             <a:ext uri="{FAA26D3D-D897-4be2-8F04-BA451C77F1D7}">
-              <ma14:placeholderFlag xmlns:ma14="http://schemas.microsoft.com/office/mac/drawingml/2011/main" xmlns="" val="1"/>
+              <ma14:placeholderFlag xmlns="" xmlns:ma14="http://schemas.microsoft.com/office/mac/drawingml/2011/main" val="1"/>
             </a:ext>
           </a:extLst>
         </p:spPr>
@@ -2096,14 +2096,14 @@
           <a:noFill/>
           <a:extLst>
             <a:ext uri="{909E8E84-426E-40dd-AFC4-6F175D3DCCD1}">
-              <a14:hiddenFill xmlns:a14="http://schemas.microsoft.com/office/drawing/2010/main" xmlns="">
+              <a14:hiddenFill xmlns="" xmlns:a14="http://schemas.microsoft.com/office/drawing/2010/main">
                 <a:solidFill>
                   <a:srgbClr val="FFFFFF"/>
                 </a:solidFill>
               </a14:hiddenFill>
             </a:ext>
             <a:ext uri="{91240B29-F687-4f45-9708-019B960494DF}">
-              <a14:hiddenLine xmlns:a14="http://schemas.microsoft.com/office/drawing/2010/main" xmlns="" w="9525">
+              <a14:hiddenLine xmlns="" xmlns:a14="http://schemas.microsoft.com/office/drawing/2010/main" w="9525">
                 <a:solidFill>
                   <a:srgbClr val="000000"/>
                 </a:solidFill>
@@ -2267,7 +2267,7 @@
           </a:ln>
           <a:extLst>
             <a:ext uri="{FAA26D3D-D897-4be2-8F04-BA451C77F1D7}">
-              <ma14:placeholderFlag xmlns:ma14="http://schemas.microsoft.com/office/mac/drawingml/2011/main" xmlns="" val="1"/>
+              <ma14:placeholderFlag xmlns="" xmlns:ma14="http://schemas.microsoft.com/office/mac/drawingml/2011/main" val="1"/>
             </a:ext>
           </a:extLst>
         </p:spPr>
@@ -2296,7 +2296,7 @@
           </a:ln>
           <a:extLst>
             <a:ext uri="{FAA26D3D-D897-4be2-8F04-BA451C77F1D7}">
-              <ma14:placeholderFlag xmlns:ma14="http://schemas.microsoft.com/office/mac/drawingml/2011/main" xmlns="" val="1"/>
+              <ma14:placeholderFlag xmlns="" xmlns:ma14="http://schemas.microsoft.com/office/mac/drawingml/2011/main" val="1"/>
             </a:ext>
           </a:extLst>
         </p:spPr>
@@ -2856,14 +2856,14 @@
           <a:noFill/>
           <a:extLst>
             <a:ext uri="{909E8E84-426E-40dd-AFC4-6F175D3DCCD1}">
-              <a14:hiddenFill xmlns:a14="http://schemas.microsoft.com/office/drawing/2010/main" xmlns="">
+              <a14:hiddenFill xmlns="" xmlns:a14="http://schemas.microsoft.com/office/drawing/2010/main">
                 <a:solidFill>
                   <a:srgbClr val="FFFFFF"/>
                 </a:solidFill>
               </a14:hiddenFill>
             </a:ext>
             <a:ext uri="{91240B29-F687-4f45-9708-019B960494DF}">
-              <a14:hiddenLine xmlns:a14="http://schemas.microsoft.com/office/drawing/2010/main" xmlns="" w="9525">
+              <a14:hiddenLine xmlns="" xmlns:a14="http://schemas.microsoft.com/office/drawing/2010/main" w="9525">
                 <a:solidFill>
                   <a:srgbClr val="000000"/>
                 </a:solidFill>
@@ -3027,7 +3027,7 @@
           </a:ln>
           <a:extLst>
             <a:ext uri="{FAA26D3D-D897-4be2-8F04-BA451C77F1D7}">
-              <ma14:placeholderFlag xmlns:ma14="http://schemas.microsoft.com/office/mac/drawingml/2011/main" xmlns="" val="1"/>
+              <ma14:placeholderFlag xmlns="" xmlns:ma14="http://schemas.microsoft.com/office/mac/drawingml/2011/main" val="1"/>
             </a:ext>
           </a:extLst>
         </p:spPr>
@@ -3056,7 +3056,7 @@
           </a:ln>
           <a:extLst>
             <a:ext uri="{FAA26D3D-D897-4be2-8F04-BA451C77F1D7}">
-              <ma14:placeholderFlag xmlns:ma14="http://schemas.microsoft.com/office/mac/drawingml/2011/main" xmlns="" val="1"/>
+              <ma14:placeholderFlag xmlns="" xmlns:ma14="http://schemas.microsoft.com/office/mac/drawingml/2011/main" val="1"/>
             </a:ext>
           </a:extLst>
         </p:spPr>
@@ -3116,14 +3116,14 @@
           <a:noFill/>
           <a:extLst>
             <a:ext uri="{909E8E84-426E-40dd-AFC4-6F175D3DCCD1}">
-              <a14:hiddenFill xmlns:a14="http://schemas.microsoft.com/office/drawing/2010/main" xmlns="">
+              <a14:hiddenFill xmlns="" xmlns:a14="http://schemas.microsoft.com/office/drawing/2010/main">
                 <a:solidFill>
                   <a:srgbClr val="FFFFFF"/>
                 </a:solidFill>
               </a14:hiddenFill>
             </a:ext>
             <a:ext uri="{91240B29-F687-4f45-9708-019B960494DF}">
-              <a14:hiddenLine xmlns:a14="http://schemas.microsoft.com/office/drawing/2010/main" xmlns="" w="9525">
+              <a14:hiddenLine xmlns="" xmlns:a14="http://schemas.microsoft.com/office/drawing/2010/main" w="9525">
                 <a:solidFill>
                   <a:srgbClr val="000000"/>
                 </a:solidFill>
@@ -3287,7 +3287,7 @@
           </a:ln>
           <a:extLst>
             <a:ext uri="{FAA26D3D-D897-4be2-8F04-BA451C77F1D7}">
-              <ma14:placeholderFlag xmlns:ma14="http://schemas.microsoft.com/office/mac/drawingml/2011/main" xmlns="" val="1"/>
+              <ma14:placeholderFlag xmlns="" xmlns:ma14="http://schemas.microsoft.com/office/mac/drawingml/2011/main" val="1"/>
             </a:ext>
           </a:extLst>
         </p:spPr>
@@ -3316,7 +3316,7 @@
           </a:ln>
           <a:extLst>
             <a:ext uri="{FAA26D3D-D897-4be2-8F04-BA451C77F1D7}">
-              <ma14:placeholderFlag xmlns:ma14="http://schemas.microsoft.com/office/mac/drawingml/2011/main" xmlns="" val="1"/>
+              <ma14:placeholderFlag xmlns="" xmlns:ma14="http://schemas.microsoft.com/office/mac/drawingml/2011/main" val="1"/>
             </a:ext>
           </a:extLst>
         </p:spPr>
@@ -3376,14 +3376,14 @@
           <a:noFill/>
           <a:extLst>
             <a:ext uri="{909E8E84-426E-40dd-AFC4-6F175D3DCCD1}">
-              <a14:hiddenFill xmlns:a14="http://schemas.microsoft.com/office/drawing/2010/main" xmlns="">
+              <a14:hiddenFill xmlns="" xmlns:a14="http://schemas.microsoft.com/office/drawing/2010/main">
                 <a:solidFill>
                   <a:srgbClr val="FFFFFF"/>
                 </a:solidFill>
               </a14:hiddenFill>
             </a:ext>
             <a:ext uri="{91240B29-F687-4f45-9708-019B960494DF}">
-              <a14:hiddenLine xmlns:a14="http://schemas.microsoft.com/office/drawing/2010/main" xmlns="" w="9525">
+              <a14:hiddenLine xmlns="" xmlns:a14="http://schemas.microsoft.com/office/drawing/2010/main" w="9525">
                 <a:solidFill>
                   <a:srgbClr val="000000"/>
                 </a:solidFill>
@@ -3547,7 +3547,7 @@
           </a:ln>
           <a:extLst>
             <a:ext uri="{FAA26D3D-D897-4be2-8F04-BA451C77F1D7}">
-              <ma14:placeholderFlag xmlns:ma14="http://schemas.microsoft.com/office/mac/drawingml/2011/main" xmlns="" val="1"/>
+              <ma14:placeholderFlag xmlns="" xmlns:ma14="http://schemas.microsoft.com/office/mac/drawingml/2011/main" val="1"/>
             </a:ext>
           </a:extLst>
         </p:spPr>
@@ -3576,7 +3576,7 @@
           </a:ln>
           <a:extLst>
             <a:ext uri="{FAA26D3D-D897-4be2-8F04-BA451C77F1D7}">
-              <ma14:placeholderFlag xmlns:ma14="http://schemas.microsoft.com/office/mac/drawingml/2011/main" xmlns="" val="1"/>
+              <ma14:placeholderFlag xmlns="" xmlns:ma14="http://schemas.microsoft.com/office/mac/drawingml/2011/main" val="1"/>
             </a:ext>
           </a:extLst>
         </p:spPr>
@@ -4035,14 +4035,14 @@
           </a:ln>
           <a:extLst>
             <a:ext uri="{909E8E84-426E-40dd-AFC4-6F175D3DCCD1}">
-              <a14:hiddenFill xmlns:a14="http://schemas.microsoft.com/office/drawing/2010/main" xmlns="">
+              <a14:hiddenFill xmlns="" xmlns:a14="http://schemas.microsoft.com/office/drawing/2010/main">
                 <a:solidFill>
                   <a:srgbClr val="FFFFFF"/>
                 </a:solidFill>
               </a14:hiddenFill>
             </a:ext>
             <a:ext uri="{FAA26D3D-D897-4be2-8F04-BA451C77F1D7}">
-              <ma14:placeholderFlag xmlns:ma14="http://schemas.microsoft.com/office/mac/drawingml/2011/main" xmlns="" val="1"/>
+              <ma14:placeholderFlag xmlns="" xmlns:ma14="http://schemas.microsoft.com/office/mac/drawingml/2011/main" val="1"/>
             </a:ext>
           </a:extLst>
         </p:spPr>
@@ -4061,14 +4061,14 @@
           <a:noFill/>
           <a:extLst>
             <a:ext uri="{909E8E84-426E-40dd-AFC4-6F175D3DCCD1}">
-              <a14:hiddenFill xmlns:a14="http://schemas.microsoft.com/office/drawing/2010/main" xmlns="">
+              <a14:hiddenFill xmlns="" xmlns:a14="http://schemas.microsoft.com/office/drawing/2010/main">
                 <a:solidFill>
                   <a:srgbClr val="FFFFFF"/>
                 </a:solidFill>
               </a14:hiddenFill>
             </a:ext>
             <a:ext uri="{91240B29-F687-4f45-9708-019B960494DF}">
-              <a14:hiddenLine xmlns:a14="http://schemas.microsoft.com/office/drawing/2010/main" xmlns="" w="9525">
+              <a14:hiddenLine xmlns="" xmlns:a14="http://schemas.microsoft.com/office/drawing/2010/main" w="9525">
                 <a:solidFill>
                   <a:srgbClr val="000000"/>
                 </a:solidFill>
@@ -4078,7 +4078,7 @@
               </a14:hiddenLine>
             </a:ext>
             <a:ext uri="{FAA26D3D-D897-4be2-8F04-BA451C77F1D7}">
-              <ma14:placeholderFlag xmlns:ma14="http://schemas.microsoft.com/office/mac/drawingml/2011/main" xmlns="" val="1"/>
+              <ma14:placeholderFlag xmlns="" xmlns:ma14="http://schemas.microsoft.com/office/mac/drawingml/2011/main" val="1"/>
             </a:ext>
           </a:extLst>
         </p:spPr>
@@ -4112,14 +4112,14 @@
           <a:noFill/>
           <a:extLst>
             <a:ext uri="{909E8E84-426E-40dd-AFC4-6F175D3DCCD1}">
-              <a14:hiddenFill xmlns:a14="http://schemas.microsoft.com/office/drawing/2010/main" xmlns="">
+              <a14:hiddenFill xmlns="" xmlns:a14="http://schemas.microsoft.com/office/drawing/2010/main">
                 <a:solidFill>
                   <a:srgbClr val="FFFFFF"/>
                 </a:solidFill>
               </a14:hiddenFill>
             </a:ext>
             <a:ext uri="{91240B29-F687-4f45-9708-019B960494DF}">
-              <a14:hiddenLine xmlns:a14="http://schemas.microsoft.com/office/drawing/2010/main" xmlns="" w="9525">
+              <a14:hiddenLine xmlns="" xmlns:a14="http://schemas.microsoft.com/office/drawing/2010/main" w="9525">
                 <a:solidFill>
                   <a:srgbClr val="000000"/>
                 </a:solidFill>
@@ -4294,14 +4294,14 @@
           <a:noFill/>
           <a:extLst>
             <a:ext uri="{909E8E84-426E-40dd-AFC4-6F175D3DCCD1}">
-              <a14:hiddenFill xmlns:a14="http://schemas.microsoft.com/office/drawing/2010/main" xmlns="">
+              <a14:hiddenFill xmlns="" xmlns:a14="http://schemas.microsoft.com/office/drawing/2010/main">
                 <a:solidFill>
                   <a:srgbClr val="FFFFFF"/>
                 </a:solidFill>
               </a14:hiddenFill>
             </a:ext>
             <a:ext uri="{91240B29-F687-4f45-9708-019B960494DF}">
-              <a14:hiddenLine xmlns:a14="http://schemas.microsoft.com/office/drawing/2010/main" xmlns="" w="9525">
+              <a14:hiddenLine xmlns="" xmlns:a14="http://schemas.microsoft.com/office/drawing/2010/main" w="9525">
                 <a:solidFill>
                   <a:srgbClr val="000000"/>
                 </a:solidFill>
@@ -4465,7 +4465,7 @@
           </a:ln>
           <a:extLst>
             <a:ext uri="{FAA26D3D-D897-4be2-8F04-BA451C77F1D7}">
-              <ma14:placeholderFlag xmlns:ma14="http://schemas.microsoft.com/office/mac/drawingml/2011/main" xmlns="" val="1"/>
+              <ma14:placeholderFlag xmlns="" xmlns:ma14="http://schemas.microsoft.com/office/mac/drawingml/2011/main" val="1"/>
             </a:ext>
           </a:extLst>
         </p:spPr>
@@ -4494,7 +4494,7 @@
           </a:ln>
           <a:extLst>
             <a:ext uri="{FAA26D3D-D897-4be2-8F04-BA451C77F1D7}">
-              <ma14:placeholderFlag xmlns:ma14="http://schemas.microsoft.com/office/mac/drawingml/2011/main" xmlns="" val="1"/>
+              <ma14:placeholderFlag xmlns="" xmlns:ma14="http://schemas.microsoft.com/office/mac/drawingml/2011/main" val="1"/>
             </a:ext>
           </a:extLst>
         </p:spPr>
@@ -4554,14 +4554,14 @@
           <a:noFill/>
           <a:extLst>
             <a:ext uri="{909E8E84-426E-40dd-AFC4-6F175D3DCCD1}">
-              <a14:hiddenFill xmlns:a14="http://schemas.microsoft.com/office/drawing/2010/main" xmlns="">
+              <a14:hiddenFill xmlns="" xmlns:a14="http://schemas.microsoft.com/office/drawing/2010/main">
                 <a:solidFill>
                   <a:srgbClr val="FFFFFF"/>
                 </a:solidFill>
               </a14:hiddenFill>
             </a:ext>
             <a:ext uri="{91240B29-F687-4f45-9708-019B960494DF}">
-              <a14:hiddenLine xmlns:a14="http://schemas.microsoft.com/office/drawing/2010/main" xmlns="" w="9525">
+              <a14:hiddenLine xmlns="" xmlns:a14="http://schemas.microsoft.com/office/drawing/2010/main" w="9525">
                 <a:solidFill>
                   <a:srgbClr val="000000"/>
                 </a:solidFill>
@@ -4725,7 +4725,7 @@
           </a:ln>
           <a:extLst>
             <a:ext uri="{FAA26D3D-D897-4be2-8F04-BA451C77F1D7}">
-              <ma14:placeholderFlag xmlns:ma14="http://schemas.microsoft.com/office/mac/drawingml/2011/main" xmlns="" val="1"/>
+              <ma14:placeholderFlag xmlns="" xmlns:ma14="http://schemas.microsoft.com/office/mac/drawingml/2011/main" val="1"/>
             </a:ext>
           </a:extLst>
         </p:spPr>
@@ -4754,7 +4754,7 @@
           </a:ln>
           <a:extLst>
             <a:ext uri="{FAA26D3D-D897-4be2-8F04-BA451C77F1D7}">
-              <ma14:placeholderFlag xmlns:ma14="http://schemas.microsoft.com/office/mac/drawingml/2011/main" xmlns="" val="1"/>
+              <ma14:placeholderFlag xmlns="" xmlns:ma14="http://schemas.microsoft.com/office/mac/drawingml/2011/main" val="1"/>
             </a:ext>
           </a:extLst>
         </p:spPr>
@@ -4921,14 +4921,14 @@
           <a:noFill/>
           <a:extLst>
             <a:ext uri="{909E8E84-426E-40dd-AFC4-6F175D3DCCD1}">
-              <a14:hiddenFill xmlns:a14="http://schemas.microsoft.com/office/drawing/2010/main" xmlns="">
+              <a14:hiddenFill xmlns="" xmlns:a14="http://schemas.microsoft.com/office/drawing/2010/main">
                 <a:solidFill>
                   <a:srgbClr val="FFFFFF"/>
                 </a:solidFill>
               </a14:hiddenFill>
             </a:ext>
             <a:ext uri="{91240B29-F687-4f45-9708-019B960494DF}">
-              <a14:hiddenLine xmlns:a14="http://schemas.microsoft.com/office/drawing/2010/main" xmlns="" w="9525">
+              <a14:hiddenLine xmlns="" xmlns:a14="http://schemas.microsoft.com/office/drawing/2010/main" w="9525">
                 <a:solidFill>
                   <a:srgbClr val="000000"/>
                 </a:solidFill>
@@ -5092,7 +5092,7 @@
           </a:ln>
           <a:extLst>
             <a:ext uri="{FAA26D3D-D897-4be2-8F04-BA451C77F1D7}">
-              <ma14:placeholderFlag xmlns:ma14="http://schemas.microsoft.com/office/mac/drawingml/2011/main" xmlns="" val="1"/>
+              <ma14:placeholderFlag xmlns="" xmlns:ma14="http://schemas.microsoft.com/office/mac/drawingml/2011/main" val="1"/>
             </a:ext>
           </a:extLst>
         </p:spPr>
@@ -5121,7 +5121,7 @@
           </a:ln>
           <a:extLst>
             <a:ext uri="{FAA26D3D-D897-4be2-8F04-BA451C77F1D7}">
-              <ma14:placeholderFlag xmlns:ma14="http://schemas.microsoft.com/office/mac/drawingml/2011/main" xmlns="" val="1"/>
+              <ma14:placeholderFlag xmlns="" xmlns:ma14="http://schemas.microsoft.com/office/mac/drawingml/2011/main" val="1"/>
             </a:ext>
           </a:extLst>
         </p:spPr>
@@ -5181,14 +5181,14 @@
           <a:noFill/>
           <a:extLst>
             <a:ext uri="{909E8E84-426E-40dd-AFC4-6F175D3DCCD1}">
-              <a14:hiddenFill xmlns:a14="http://schemas.microsoft.com/office/drawing/2010/main" xmlns="">
+              <a14:hiddenFill xmlns="" xmlns:a14="http://schemas.microsoft.com/office/drawing/2010/main">
                 <a:solidFill>
                   <a:srgbClr val="FFFFFF"/>
                 </a:solidFill>
               </a14:hiddenFill>
             </a:ext>
             <a:ext uri="{91240B29-F687-4f45-9708-019B960494DF}">
-              <a14:hiddenLine xmlns:a14="http://schemas.microsoft.com/office/drawing/2010/main" xmlns="" w="9525">
+              <a14:hiddenLine xmlns="" xmlns:a14="http://schemas.microsoft.com/office/drawing/2010/main" w="9525">
                 <a:solidFill>
                   <a:srgbClr val="000000"/>
                 </a:solidFill>
@@ -5352,7 +5352,7 @@
           </a:ln>
           <a:extLst>
             <a:ext uri="{FAA26D3D-D897-4be2-8F04-BA451C77F1D7}">
-              <ma14:placeholderFlag xmlns:ma14="http://schemas.microsoft.com/office/mac/drawingml/2011/main" xmlns="" val="1"/>
+              <ma14:placeholderFlag xmlns="" xmlns:ma14="http://schemas.microsoft.com/office/mac/drawingml/2011/main" val="1"/>
             </a:ext>
           </a:extLst>
         </p:spPr>
@@ -5381,7 +5381,7 @@
           </a:ln>
           <a:extLst>
             <a:ext uri="{FAA26D3D-D897-4be2-8F04-BA451C77F1D7}">
-              <ma14:placeholderFlag xmlns:ma14="http://schemas.microsoft.com/office/mac/drawingml/2011/main" xmlns="" val="1"/>
+              <ma14:placeholderFlag xmlns="" xmlns:ma14="http://schemas.microsoft.com/office/mac/drawingml/2011/main" val="1"/>
             </a:ext>
           </a:extLst>
         </p:spPr>
@@ -5441,14 +5441,14 @@
           <a:noFill/>
           <a:extLst>
             <a:ext uri="{909E8E84-426E-40dd-AFC4-6F175D3DCCD1}">
-              <a14:hiddenFill xmlns:a14="http://schemas.microsoft.com/office/drawing/2010/main" xmlns="">
+              <a14:hiddenFill xmlns="" xmlns:a14="http://schemas.microsoft.com/office/drawing/2010/main">
                 <a:solidFill>
                   <a:srgbClr val="FFFFFF"/>
                 </a:solidFill>
               </a14:hiddenFill>
             </a:ext>
             <a:ext uri="{91240B29-F687-4f45-9708-019B960494DF}">
-              <a14:hiddenLine xmlns:a14="http://schemas.microsoft.com/office/drawing/2010/main" xmlns="" w="9525">
+              <a14:hiddenLine xmlns="" xmlns:a14="http://schemas.microsoft.com/office/drawing/2010/main" w="9525">
                 <a:solidFill>
                   <a:srgbClr val="000000"/>
                 </a:solidFill>
@@ -5612,7 +5612,7 @@
           </a:ln>
           <a:extLst>
             <a:ext uri="{FAA26D3D-D897-4be2-8F04-BA451C77F1D7}">
-              <ma14:placeholderFlag xmlns:ma14="http://schemas.microsoft.com/office/mac/drawingml/2011/main" xmlns="" val="1"/>
+              <ma14:placeholderFlag xmlns="" xmlns:ma14="http://schemas.microsoft.com/office/mac/drawingml/2011/main" val="1"/>
             </a:ext>
           </a:extLst>
         </p:spPr>
@@ -5641,7 +5641,7 @@
           </a:ln>
           <a:extLst>
             <a:ext uri="{FAA26D3D-D897-4be2-8F04-BA451C77F1D7}">
-              <ma14:placeholderFlag xmlns:ma14="http://schemas.microsoft.com/office/mac/drawingml/2011/main" xmlns="" val="1"/>
+              <ma14:placeholderFlag xmlns="" xmlns:ma14="http://schemas.microsoft.com/office/mac/drawingml/2011/main" val="1"/>
             </a:ext>
           </a:extLst>
         </p:spPr>
@@ -5777,14 +5777,14 @@
           </a:ln>
           <a:extLst>
             <a:ext uri="{909E8E84-426E-40dd-AFC4-6F175D3DCCD1}">
-              <a14:hiddenFill xmlns:a14="http://schemas.microsoft.com/office/drawing/2010/main" xmlns="">
+              <a14:hiddenFill xmlns="" xmlns:a14="http://schemas.microsoft.com/office/drawing/2010/main">
                 <a:solidFill>
                   <a:srgbClr val="FFFFFF"/>
                 </a:solidFill>
               </a14:hiddenFill>
             </a:ext>
             <a:ext uri="{91240B29-F687-4f45-9708-019B960494DF}">
-              <a14:hiddenLine xmlns:a14="http://schemas.microsoft.com/office/drawing/2010/main" xmlns="" w="9525">
+              <a14:hiddenLine xmlns="" xmlns:a14="http://schemas.microsoft.com/office/drawing/2010/main" w="9525">
                 <a:solidFill>
                   <a:srgbClr val="000000"/>
                 </a:solidFill>
@@ -7386,14 +7386,14 @@
           </a:ln>
           <a:extLst>
             <a:ext uri="{909E8E84-426E-40dd-AFC4-6F175D3DCCD1}">
-              <a14:hiddenFill xmlns:a14="http://schemas.microsoft.com/office/drawing/2010/main" xmlns="">
+              <a14:hiddenFill xmlns="" xmlns:a14="http://schemas.microsoft.com/office/drawing/2010/main">
                 <a:solidFill>
                   <a:srgbClr val="FFFFFF"/>
                 </a:solidFill>
               </a14:hiddenFill>
             </a:ext>
             <a:ext uri="{91240B29-F687-4f45-9708-019B960494DF}">
-              <a14:hiddenLine xmlns:a14="http://schemas.microsoft.com/office/drawing/2010/main" xmlns="" w="9525">
+              <a14:hiddenLine xmlns="" xmlns:a14="http://schemas.microsoft.com/office/drawing/2010/main" w="9525">
                 <a:solidFill>
                   <a:srgbClr val="000000"/>
                 </a:solidFill>
@@ -7403,7 +7403,7 @@
               </a14:hiddenLine>
             </a:ext>
             <a:ext uri="{FAA26D3D-D897-4be2-8F04-BA451C77F1D7}">
-              <ma14:placeholderFlag xmlns:ma14="http://schemas.microsoft.com/office/mac/drawingml/2011/main" xmlns="" val="1"/>
+              <ma14:placeholderFlag xmlns="" xmlns:ma14="http://schemas.microsoft.com/office/mac/drawingml/2011/main" val="1"/>
             </a:ext>
           </a:extLst>
         </p:spPr>
@@ -7447,14 +7447,14 @@
           </a:ln>
           <a:extLst>
             <a:ext uri="{909E8E84-426E-40dd-AFC4-6F175D3DCCD1}">
-              <a14:hiddenFill xmlns:a14="http://schemas.microsoft.com/office/drawing/2010/main" xmlns="">
+              <a14:hiddenFill xmlns="" xmlns:a14="http://schemas.microsoft.com/office/drawing/2010/main">
                 <a:solidFill>
                   <a:srgbClr val="FFFFFF"/>
                 </a:solidFill>
               </a14:hiddenFill>
             </a:ext>
             <a:ext uri="{91240B29-F687-4f45-9708-019B960494DF}">
-              <a14:hiddenLine xmlns:a14="http://schemas.microsoft.com/office/drawing/2010/main" xmlns="" w="9525">
+              <a14:hiddenLine xmlns="" xmlns:a14="http://schemas.microsoft.com/office/drawing/2010/main" w="9525">
                 <a:solidFill>
                   <a:srgbClr val="000000"/>
                 </a:solidFill>
@@ -7464,7 +7464,7 @@
               </a14:hiddenLine>
             </a:ext>
             <a:ext uri="{FAA26D3D-D897-4be2-8F04-BA451C77F1D7}">
-              <ma14:placeholderFlag xmlns:ma14="http://schemas.microsoft.com/office/mac/drawingml/2011/main" xmlns="" val="1"/>
+              <ma14:placeholderFlag xmlns="" xmlns:ma14="http://schemas.microsoft.com/office/mac/drawingml/2011/main" val="1"/>
             </a:ext>
           </a:extLst>
         </p:spPr>
@@ -7600,14 +7600,14 @@
           </a:ln>
           <a:extLst>
             <a:ext uri="{909E8E84-426E-40dd-AFC4-6F175D3DCCD1}">
-              <a14:hiddenFill xmlns:a14="http://schemas.microsoft.com/office/drawing/2010/main" xmlns="">
+              <a14:hiddenFill xmlns="" xmlns:a14="http://schemas.microsoft.com/office/drawing/2010/main">
                 <a:solidFill>
                   <a:srgbClr val="FFFFFF"/>
                 </a:solidFill>
               </a14:hiddenFill>
             </a:ext>
             <a:ext uri="{91240B29-F687-4f45-9708-019B960494DF}">
-              <a14:hiddenLine xmlns:a14="http://schemas.microsoft.com/office/drawing/2010/main" xmlns="" w="9525">
+              <a14:hiddenLine xmlns="" xmlns:a14="http://schemas.microsoft.com/office/drawing/2010/main" w="9525">
                 <a:solidFill>
                   <a:srgbClr val="000000"/>
                 </a:solidFill>
@@ -9135,14 +9135,14 @@
           </a:ln>
           <a:extLst>
             <a:ext uri="{909E8E84-426E-40dd-AFC4-6F175D3DCCD1}">
-              <a14:hiddenFill xmlns:a14="http://schemas.microsoft.com/office/drawing/2010/main" xmlns="">
+              <a14:hiddenFill xmlns="" xmlns:a14="http://schemas.microsoft.com/office/drawing/2010/main">
                 <a:solidFill>
                   <a:srgbClr val="FFFFFF"/>
                 </a:solidFill>
               </a14:hiddenFill>
             </a:ext>
             <a:ext uri="{91240B29-F687-4f45-9708-019B960494DF}">
-              <a14:hiddenLine xmlns:a14="http://schemas.microsoft.com/office/drawing/2010/main" xmlns="" w="9525">
+              <a14:hiddenLine xmlns="" xmlns:a14="http://schemas.microsoft.com/office/drawing/2010/main" w="9525">
                 <a:solidFill>
                   <a:srgbClr val="000000"/>
                 </a:solidFill>
@@ -9189,14 +9189,14 @@
           </a:ln>
           <a:extLst>
             <a:ext uri="{909E8E84-426E-40dd-AFC4-6F175D3DCCD1}">
-              <a14:hiddenFill xmlns:a14="http://schemas.microsoft.com/office/drawing/2010/main" xmlns="">
+              <a14:hiddenFill xmlns="" xmlns:a14="http://schemas.microsoft.com/office/drawing/2010/main">
                 <a:solidFill>
                   <a:srgbClr val="FFFFFF"/>
                 </a:solidFill>
               </a14:hiddenFill>
             </a:ext>
             <a:ext uri="{91240B29-F687-4f45-9708-019B960494DF}">
-              <a14:hiddenLine xmlns:a14="http://schemas.microsoft.com/office/drawing/2010/main" xmlns="" w="9525">
+              <a14:hiddenLine xmlns="" xmlns:a14="http://schemas.microsoft.com/office/drawing/2010/main" w="9525">
                 <a:solidFill>
                   <a:srgbClr val="000000"/>
                 </a:solidFill>
@@ -9230,14 +9230,14 @@
           </a:ln>
           <a:extLst>
             <a:ext uri="{909E8E84-426E-40dd-AFC4-6F175D3DCCD1}">
-              <a14:hiddenFill xmlns:a14="http://schemas.microsoft.com/office/drawing/2010/main" xmlns="">
+              <a14:hiddenFill xmlns="" xmlns:a14="http://schemas.microsoft.com/office/drawing/2010/main">
                 <a:solidFill>
                   <a:srgbClr val="FFFFFF"/>
                 </a:solidFill>
               </a14:hiddenFill>
             </a:ext>
             <a:ext uri="{91240B29-F687-4f45-9708-019B960494DF}">
-              <a14:hiddenLine xmlns:a14="http://schemas.microsoft.com/office/drawing/2010/main" xmlns="" w="9525">
+              <a14:hiddenLine xmlns="" xmlns:a14="http://schemas.microsoft.com/office/drawing/2010/main" w="9525">
                 <a:solidFill>
                   <a:srgbClr val="000000"/>
                 </a:solidFill>
@@ -9391,14 +9391,14 @@
           </a:ln>
           <a:extLst>
             <a:ext uri="{909E8E84-426E-40dd-AFC4-6F175D3DCCD1}">
-              <a14:hiddenFill xmlns:a14="http://schemas.microsoft.com/office/drawing/2010/main" xmlns="">
+              <a14:hiddenFill xmlns="" xmlns:a14="http://schemas.microsoft.com/office/drawing/2010/main">
                 <a:solidFill>
                   <a:srgbClr val="FFFFFF"/>
                 </a:solidFill>
               </a14:hiddenFill>
             </a:ext>
             <a:ext uri="{91240B29-F687-4f45-9708-019B960494DF}">
-              <a14:hiddenLine xmlns:a14="http://schemas.microsoft.com/office/drawing/2010/main" xmlns="" w="9525">
+              <a14:hiddenLine xmlns="" xmlns:a14="http://schemas.microsoft.com/office/drawing/2010/main" w="9525">
                 <a:solidFill>
                   <a:srgbClr val="000000"/>
                 </a:solidFill>
@@ -10489,14 +10489,14 @@
           </a:ln>
           <a:extLst>
             <a:ext uri="{909E8E84-426E-40dd-AFC4-6F175D3DCCD1}">
-              <a14:hiddenFill xmlns:a14="http://schemas.microsoft.com/office/drawing/2010/main" xmlns="">
+              <a14:hiddenFill xmlns="" xmlns:a14="http://schemas.microsoft.com/office/drawing/2010/main">
                 <a:solidFill>
                   <a:srgbClr val="FFFFFF"/>
                 </a:solidFill>
               </a14:hiddenFill>
             </a:ext>
             <a:ext uri="{91240B29-F687-4f45-9708-019B960494DF}">
-              <a14:hiddenLine xmlns:a14="http://schemas.microsoft.com/office/drawing/2010/main" xmlns="" w="9525">
+              <a14:hiddenLine xmlns="" xmlns:a14="http://schemas.microsoft.com/office/drawing/2010/main" w="9525">
                 <a:solidFill>
                   <a:srgbClr val="000000"/>
                 </a:solidFill>
@@ -12237,14 +12237,14 @@
           </a:ln>
           <a:extLst>
             <a:ext uri="{909E8E84-426E-40dd-AFC4-6F175D3DCCD1}">
-              <a14:hiddenFill xmlns:a14="http://schemas.microsoft.com/office/drawing/2010/main" xmlns="">
+              <a14:hiddenFill xmlns="" xmlns:a14="http://schemas.microsoft.com/office/drawing/2010/main">
                 <a:solidFill>
                   <a:srgbClr val="FFFFFF"/>
                 </a:solidFill>
               </a14:hiddenFill>
             </a:ext>
             <a:ext uri="{91240B29-F687-4f45-9708-019B960494DF}">
-              <a14:hiddenLine xmlns:a14="http://schemas.microsoft.com/office/drawing/2010/main" xmlns="" w="9525">
+              <a14:hiddenLine xmlns="" xmlns:a14="http://schemas.microsoft.com/office/drawing/2010/main" w="9525">
                 <a:solidFill>
                   <a:srgbClr val="000000"/>
                 </a:solidFill>
@@ -13137,14 +13137,14 @@
           </a:ln>
           <a:extLst>
             <a:ext uri="{909E8E84-426E-40dd-AFC4-6F175D3DCCD1}">
-              <a14:hiddenFill xmlns="" xmlns:a14="http://schemas.microsoft.com/office/drawing/2010/main">
+              <a14:hiddenFill xmlns:a14="http://schemas.microsoft.com/office/drawing/2010/main" xmlns="">
                 <a:solidFill>
                   <a:srgbClr val="FFFFFF"/>
                 </a:solidFill>
               </a14:hiddenFill>
             </a:ext>
             <a:ext uri="{91240B29-F687-4f45-9708-019B960494DF}">
-              <a14:hiddenLine xmlns="" xmlns:a14="http://schemas.microsoft.com/office/drawing/2010/main" w="9525">
+              <a14:hiddenLine xmlns:a14="http://schemas.microsoft.com/office/drawing/2010/main" xmlns="" w="9525">
                 <a:solidFill>
                   <a:srgbClr val="000000"/>
                 </a:solidFill>
@@ -13308,20 +13308,6 @@
               <a:rPr lang="en-US" dirty="0"/>
               <a:t>Module 4: Alignment Free Expression Estimation</a:t>
             </a:r>
-          </a:p>
-          <a:p>
-            <a:pPr>
-              <a:defRPr/>
-            </a:pPr>
-            <a:r>
-              <a:rPr lang="en-US" dirty="0"/>
-              <a:t>Module 5: Single Cell RNA-</a:t>
-            </a:r>
-            <a:r>
-              <a:rPr lang="en-US" dirty="0" err="1"/>
-              <a:t>Seq</a:t>
-            </a:r>
-            <a:endParaRPr lang="en-US" dirty="0"/>
           </a:p>
           <a:p>
             <a:pPr marL="0" indent="0">

</xml_diff>